<commit_message>
v0.14 WQFS class setup
</commit_message>
<xml_diff>
--- a/WQFS.pptx
+++ b/WQFS.pptx
@@ -4077,17 +4077,112 @@
           </a:xfrm>
         </p:spPr>
         <p:txBody>
-          <a:bodyPr anchor="ctr"/>
-          <a:lstStyle/>
-          <a:p>
-            <a:r>
-              <a:rPr lang="en-US" altLang="ko-KR" dirty="0">
+          <a:bodyPr anchor="ctr">
+            <a:noAutofit/>
+          </a:bodyPr>
+          <a:lstStyle/>
+          <a:p>
+            <a:r>
+              <a:rPr lang="en-US" altLang="ko-KR" sz="2800" dirty="0">
                 <a:latin typeface="HY견고딕" panose="02030600000101010101" pitchFamily="18" charset="-127"/>
                 <a:ea typeface="HY견고딕" panose="02030600000101010101" pitchFamily="18" charset="-127"/>
               </a:rPr>
-              <a:t>(World event &amp; Quest Fusion System)</a:t>
-            </a:r>
-            <a:endParaRPr lang="ko-KR" altLang="en-US" dirty="0">
+              <a:t>(W</a:t>
+            </a:r>
+            <a:r>
+              <a:rPr lang="en-US" altLang="ko-KR" sz="2800" dirty="0">
+                <a:solidFill>
+                  <a:schemeClr val="bg2">
+                    <a:lumMod val="50000"/>
+                  </a:schemeClr>
+                </a:solidFill>
+                <a:latin typeface="HY견고딕" panose="02030600000101010101" pitchFamily="18" charset="-127"/>
+                <a:ea typeface="HY견고딕" panose="02030600000101010101" pitchFamily="18" charset="-127"/>
+              </a:rPr>
+              <a:t>orld event</a:t>
+            </a:r>
+            <a:r>
+              <a:rPr lang="en-US" altLang="ko-KR" sz="2800" dirty="0">
+                <a:latin typeface="HY견고딕" panose="02030600000101010101" pitchFamily="18" charset="-127"/>
+                <a:ea typeface="HY견고딕" panose="02030600000101010101" pitchFamily="18" charset="-127"/>
+              </a:rPr>
+              <a:t> </a:t>
+            </a:r>
+            <a:r>
+              <a:rPr lang="en-US" altLang="ko-KR" sz="2800" dirty="0">
+                <a:solidFill>
+                  <a:schemeClr val="bg2">
+                    <a:lumMod val="50000"/>
+                  </a:schemeClr>
+                </a:solidFill>
+                <a:latin typeface="HY견고딕" panose="02030600000101010101" pitchFamily="18" charset="-127"/>
+                <a:ea typeface="HY견고딕" panose="02030600000101010101" pitchFamily="18" charset="-127"/>
+              </a:rPr>
+              <a:t>&amp;</a:t>
+            </a:r>
+            <a:r>
+              <a:rPr lang="en-US" altLang="ko-KR" sz="2800" dirty="0">
+                <a:latin typeface="HY견고딕" panose="02030600000101010101" pitchFamily="18" charset="-127"/>
+                <a:ea typeface="HY견고딕" panose="02030600000101010101" pitchFamily="18" charset="-127"/>
+              </a:rPr>
+              <a:t> Q</a:t>
+            </a:r>
+            <a:r>
+              <a:rPr lang="en-US" altLang="ko-KR" sz="2800" dirty="0">
+                <a:solidFill>
+                  <a:schemeClr val="bg2">
+                    <a:lumMod val="50000"/>
+                  </a:schemeClr>
+                </a:solidFill>
+                <a:latin typeface="HY견고딕" panose="02030600000101010101" pitchFamily="18" charset="-127"/>
+                <a:ea typeface="HY견고딕" panose="02030600000101010101" pitchFamily="18" charset="-127"/>
+              </a:rPr>
+              <a:t>uest </a:t>
+            </a:r>
+            <a:r>
+              <a:rPr lang="en-US" altLang="ko-KR" sz="2800" dirty="0">
+                <a:latin typeface="HY견고딕" panose="02030600000101010101" pitchFamily="18" charset="-127"/>
+                <a:ea typeface="HY견고딕" panose="02030600000101010101" pitchFamily="18" charset="-127"/>
+              </a:rPr>
+              <a:t>F</a:t>
+            </a:r>
+            <a:r>
+              <a:rPr lang="en-US" altLang="ko-KR" sz="2800" dirty="0">
+                <a:solidFill>
+                  <a:schemeClr val="bg2">
+                    <a:lumMod val="50000"/>
+                  </a:schemeClr>
+                </a:solidFill>
+                <a:latin typeface="HY견고딕" panose="02030600000101010101" pitchFamily="18" charset="-127"/>
+                <a:ea typeface="HY견고딕" panose="02030600000101010101" pitchFamily="18" charset="-127"/>
+              </a:rPr>
+              <a:t>usion </a:t>
+            </a:r>
+            <a:r>
+              <a:rPr lang="en-US" altLang="ko-KR" sz="2800" dirty="0">
+                <a:latin typeface="HY견고딕" panose="02030600000101010101" pitchFamily="18" charset="-127"/>
+                <a:ea typeface="HY견고딕" panose="02030600000101010101" pitchFamily="18" charset="-127"/>
+              </a:rPr>
+              <a:t>S</a:t>
+            </a:r>
+            <a:r>
+              <a:rPr lang="en-US" altLang="ko-KR" sz="2800" dirty="0">
+                <a:solidFill>
+                  <a:schemeClr val="bg2">
+                    <a:lumMod val="50000"/>
+                  </a:schemeClr>
+                </a:solidFill>
+                <a:latin typeface="HY견고딕" panose="02030600000101010101" pitchFamily="18" charset="-127"/>
+                <a:ea typeface="HY견고딕" panose="02030600000101010101" pitchFamily="18" charset="-127"/>
+              </a:rPr>
+              <a:t>ystem)</a:t>
+            </a:r>
+            <a:endParaRPr lang="ko-KR" altLang="en-US" sz="2800" dirty="0">
+              <a:solidFill>
+                <a:schemeClr val="bg2">
+                  <a:lumMod val="50000"/>
+                </a:schemeClr>
+              </a:solidFill>
               <a:latin typeface="HY견고딕" panose="02030600000101010101" pitchFamily="18" charset="-127"/>
               <a:ea typeface="HY견고딕" panose="02030600000101010101" pitchFamily="18" charset="-127"/>
             </a:endParaRPr>

</xml_diff>